<commit_message>
Update the Q1 report and parser_log.py
</commit_message>
<xml_diff>
--- a/kpi/Automation Testing/Automation Testing_20200320.pptx
+++ b/kpi/Automation Testing/Automation Testing_20200320.pptx
@@ -151,7 +151,7 @@
   </p:defaultTextStyle>
   <p:extLst>
     <p:ext uri="{EFAFB233-063F-42B5-8137-9DF3F51BA10A}">
-      <p15:sldGuideLst xmlns:p15="http://schemas.microsoft.com/office/powerpoint/2012/main" xmlns="">
+      <p15:sldGuideLst xmlns="" xmlns:p15="http://schemas.microsoft.com/office/powerpoint/2012/main">
         <p15:guide id="1" orient="horz" pos="1620">
           <p15:clr>
             <a:srgbClr val="A4A3A4"/>
@@ -165,7 +165,7 @@
       </p15:sldGuideLst>
     </p:ext>
     <p:ext uri="{2D200454-40CA-4A62-9FC3-DE9A4176ACB9}">
-      <p15:notesGuideLst xmlns:p15="http://schemas.microsoft.com/office/powerpoint/2012/main" xmlns="">
+      <p15:notesGuideLst xmlns="" xmlns:p15="http://schemas.microsoft.com/office/powerpoint/2012/main">
         <p15:guide id="1" orient="horz" pos="3223">
           <p15:clr>
             <a:srgbClr val="A4A3A4"/>
@@ -9200,19 +9200,8 @@
                 <a:latin typeface="Times New Roman" panose="02020603050405020304" pitchFamily="18" charset="0"/>
                 <a:cs typeface="Times New Roman" panose="02020603050405020304" pitchFamily="18" charset="0"/>
               </a:rPr>
-              <a:t>Benefits of Automation </a:t>
-            </a:r>
-            <a:r>
-              <a:rPr lang="en-US" altLang="zh-TW" sz="2400" dirty="0">
-                <a:latin typeface="Times New Roman" panose="02020603050405020304" pitchFamily="18" charset="0"/>
-                <a:cs typeface="Times New Roman" panose="02020603050405020304" pitchFamily="18" charset="0"/>
-              </a:rPr>
-              <a:t>Testing</a:t>
-            </a:r>
-            <a:endParaRPr lang="en-US" altLang="zh-TW" sz="2400" dirty="0">
-              <a:latin typeface="Times New Roman" panose="02020603050405020304" pitchFamily="18" charset="0"/>
-              <a:cs typeface="Times New Roman" panose="02020603050405020304" pitchFamily="18" charset="0"/>
-            </a:endParaRPr>
+              <a:t>Benefits of Automation Testing</a:t>
+            </a:r>
           </a:p>
           <a:p>
             <a:pPr eaLnBrk="1" hangingPunct="1">
@@ -9836,11 +9825,7 @@
           <a:p>
             <a:r>
               <a:rPr lang="en-US" altLang="zh-TW" dirty="0"/>
-              <a:t>Automation </a:t>
-            </a:r>
-            <a:r>
-              <a:rPr lang="en-US" altLang="zh-TW" dirty="0"/>
-              <a:t>Testing Tools</a:t>
+              <a:t>Automation Testing Tools</a:t>
             </a:r>
           </a:p>
         </p:txBody>
@@ -9904,10 +9889,6 @@
               </a:rPr>
               <a:t>Testing</a:t>
             </a:r>
-            <a:endParaRPr lang="en-US" altLang="zh-TW" dirty="0" smtClean="0">
-              <a:latin typeface="Times New Roman" panose="02020603050405020304" pitchFamily="18" charset="0"/>
-              <a:cs typeface="Times New Roman" panose="02020603050405020304" pitchFamily="18" charset="0"/>
-            </a:endParaRPr>
           </a:p>
         </p:txBody>
       </p:sp>
@@ -14515,14 +14496,7 @@
                 <a:latin typeface="Times New Roman" panose="02020603050405020304" pitchFamily="18" charset="0"/>
                 <a:cs typeface="Times New Roman" panose="02020603050405020304" pitchFamily="18" charset="0"/>
               </a:rPr>
-              <a:t>漫遊程式產生的紀錄檔如下</a:t>
-            </a:r>
-            <a:r>
-              <a:rPr lang="zh-TW" altLang="en-US" sz="2000" dirty="0" smtClean="0">
-                <a:latin typeface="Times New Roman" panose="02020603050405020304" pitchFamily="18" charset="0"/>
-                <a:cs typeface="Times New Roman" panose="02020603050405020304" pitchFamily="18" charset="0"/>
-              </a:rPr>
-              <a:t>：</a:t>
+              <a:t>漫遊程式產生的紀錄檔如下：</a:t>
             </a:r>
             <a:endParaRPr lang="en-US" altLang="zh-TW" sz="2000" dirty="0" smtClean="0">
               <a:latin typeface="Times New Roman" panose="02020603050405020304" pitchFamily="18" charset="0"/>
@@ -14848,11 +14822,11 @@
   <p:clrMapOvr>
     <a:masterClrMapping/>
   </p:clrMapOvr>
-  <mc:AlternateContent xmlns:mc="http://schemas.openxmlformats.org/markup-compatibility/2006">
-    <mc:Choice xmlns:p14="http://schemas.microsoft.com/office/powerpoint/2010/main" Requires="p14">
+  <mc:AlternateContent xmlns:mc="http://schemas.openxmlformats.org/markup-compatibility/2006" xmlns:p14="http://schemas.microsoft.com/office/powerpoint/2010/main">
+    <mc:Choice Requires="p14">
       <p:transition p14:dur="10" advClick="0"/>
     </mc:Choice>
-    <mc:Fallback>
+    <mc:Fallback xmlns="">
       <p:transition advClick="0"/>
     </mc:Fallback>
   </mc:AlternateContent>
@@ -14909,18 +14883,11 @@
               <a:defRPr/>
             </a:pPr>
             <a:r>
-              <a:rPr lang="zh-TW" altLang="en-US" sz="2000" dirty="0">
+              <a:rPr lang="zh-TW" altLang="en-US" sz="2000" smtClean="0">
                 <a:latin typeface="Times New Roman" panose="02020603050405020304" pitchFamily="18" charset="0"/>
                 <a:cs typeface="Times New Roman" panose="02020603050405020304" pitchFamily="18" charset="0"/>
               </a:rPr>
-              <a:t>程式</a:t>
-            </a:r>
-            <a:r>
-              <a:rPr lang="zh-TW" altLang="en-US" sz="2000" dirty="0" smtClean="0">
-                <a:latin typeface="Times New Roman" panose="02020603050405020304" pitchFamily="18" charset="0"/>
-                <a:cs typeface="Times New Roman" panose="02020603050405020304" pitchFamily="18" charset="0"/>
-              </a:rPr>
-              <a:t>改善</a:t>
+              <a:t>執行效益</a:t>
             </a:r>
             <a:endParaRPr lang="en-US" altLang="zh-TW" sz="2000" dirty="0">
               <a:latin typeface="Times New Roman" panose="02020603050405020304" pitchFamily="18" charset="0"/>

</xml_diff>